<commit_message>
Clean up Resource Diagram images for VTE
</commit_message>
<xml_diff>
--- a/input/images/source/DEQM Resource Diagram - VTE.pptx
+++ b/input/images/source/DEQM Resource Diagram - VTE.pptx
@@ -223,7 +223,7 @@
           <a:p>
             <a:fld id="{4E266053-7327-E248-83C1-2353FC77D2E7}" type="datetimeFigureOut">
               <a:rPr lang="en-US" smtClean="0"/>
-              <a:t>4/15/2021</a:t>
+              <a:t>4/16/2021</a:t>
             </a:fld>
             <a:endParaRPr lang="en-US"/>
           </a:p>
@@ -840,7 +840,7 @@
           <a:p>
             <a:fld id="{7D2F21E0-95B6-4C5C-A55D-C5056E4C25C4}" type="datetimeFigureOut">
               <a:rPr lang="en-US" smtClean="0"/>
-              <a:t>4/15/2021</a:t>
+              <a:t>4/16/2021</a:t>
             </a:fld>
             <a:endParaRPr lang="en-US"/>
           </a:p>
@@ -1008,7 +1008,7 @@
           <a:p>
             <a:fld id="{7D2F21E0-95B6-4C5C-A55D-C5056E4C25C4}" type="datetimeFigureOut">
               <a:rPr lang="en-US" smtClean="0"/>
-              <a:t>4/15/2021</a:t>
+              <a:t>4/16/2021</a:t>
             </a:fld>
             <a:endParaRPr lang="en-US"/>
           </a:p>
@@ -1186,7 +1186,7 @@
           <a:p>
             <a:fld id="{7D2F21E0-95B6-4C5C-A55D-C5056E4C25C4}" type="datetimeFigureOut">
               <a:rPr lang="en-US" smtClean="0"/>
-              <a:t>4/15/2021</a:t>
+              <a:t>4/16/2021</a:t>
             </a:fld>
             <a:endParaRPr lang="en-US"/>
           </a:p>
@@ -1354,7 +1354,7 @@
           <a:p>
             <a:fld id="{7D2F21E0-95B6-4C5C-A55D-C5056E4C25C4}" type="datetimeFigureOut">
               <a:rPr lang="en-US" smtClean="0"/>
-              <a:t>4/15/2021</a:t>
+              <a:t>4/16/2021</a:t>
             </a:fld>
             <a:endParaRPr lang="en-US"/>
           </a:p>
@@ -1599,7 +1599,7 @@
           <a:p>
             <a:fld id="{7D2F21E0-95B6-4C5C-A55D-C5056E4C25C4}" type="datetimeFigureOut">
               <a:rPr lang="en-US" smtClean="0"/>
-              <a:t>4/15/2021</a:t>
+              <a:t>4/16/2021</a:t>
             </a:fld>
             <a:endParaRPr lang="en-US"/>
           </a:p>
@@ -1884,7 +1884,7 @@
           <a:p>
             <a:fld id="{7D2F21E0-95B6-4C5C-A55D-C5056E4C25C4}" type="datetimeFigureOut">
               <a:rPr lang="en-US" smtClean="0"/>
-              <a:t>4/15/2021</a:t>
+              <a:t>4/16/2021</a:t>
             </a:fld>
             <a:endParaRPr lang="en-US"/>
           </a:p>
@@ -2303,7 +2303,7 @@
           <a:p>
             <a:fld id="{7D2F21E0-95B6-4C5C-A55D-C5056E4C25C4}" type="datetimeFigureOut">
               <a:rPr lang="en-US" smtClean="0"/>
-              <a:t>4/15/2021</a:t>
+              <a:t>4/16/2021</a:t>
             </a:fld>
             <a:endParaRPr lang="en-US"/>
           </a:p>
@@ -2420,7 +2420,7 @@
           <a:p>
             <a:fld id="{7D2F21E0-95B6-4C5C-A55D-C5056E4C25C4}" type="datetimeFigureOut">
               <a:rPr lang="en-US" smtClean="0"/>
-              <a:t>4/15/2021</a:t>
+              <a:t>4/16/2021</a:t>
             </a:fld>
             <a:endParaRPr lang="en-US"/>
           </a:p>
@@ -2515,7 +2515,7 @@
           <a:p>
             <a:fld id="{7D2F21E0-95B6-4C5C-A55D-C5056E4C25C4}" type="datetimeFigureOut">
               <a:rPr lang="en-US" smtClean="0"/>
-              <a:t>4/15/2021</a:t>
+              <a:t>4/16/2021</a:t>
             </a:fld>
             <a:endParaRPr lang="en-US"/>
           </a:p>
@@ -2790,7 +2790,7 @@
           <a:p>
             <a:fld id="{7D2F21E0-95B6-4C5C-A55D-C5056E4C25C4}" type="datetimeFigureOut">
               <a:rPr lang="en-US" smtClean="0"/>
-              <a:t>4/15/2021</a:t>
+              <a:t>4/16/2021</a:t>
             </a:fld>
             <a:endParaRPr lang="en-US"/>
           </a:p>
@@ -3042,7 +3042,7 @@
           <a:p>
             <a:fld id="{7D2F21E0-95B6-4C5C-A55D-C5056E4C25C4}" type="datetimeFigureOut">
               <a:rPr lang="en-US" smtClean="0"/>
-              <a:t>4/15/2021</a:t>
+              <a:t>4/16/2021</a:t>
             </a:fld>
             <a:endParaRPr lang="en-US"/>
           </a:p>
@@ -3253,7 +3253,7 @@
           <a:p>
             <a:fld id="{7D2F21E0-95B6-4C5C-A55D-C5056E4C25C4}" type="datetimeFigureOut">
               <a:rPr lang="en-US" smtClean="0"/>
-              <a:t>4/15/2021</a:t>
+              <a:t>4/16/2021</a:t>
             </a:fld>
             <a:endParaRPr lang="en-US"/>
           </a:p>
@@ -5314,7 +5314,7 @@
           <a:p>
             <a:r>
               <a:rPr lang="en-US" sz="2400" dirty="0"/>
-              <a:t>MeasureReport using Encounter with Principle Diagnosis</a:t>
+              <a:t>MeasureReport using Encounter with Principal Diagnosis</a:t>
             </a:r>
           </a:p>
         </p:txBody>
@@ -16130,10 +16130,9 @@
           <a:p>
             <a:pPr algn="ctr"/>
             <a:r>
-              <a:rPr lang="en-US" sz="1100" b="1" dirty="0" err="1"/>
+              <a:rPr lang="en-US" sz="1100" b="1" dirty="0"/>
               <a:t>whenUsed</a:t>
             </a:r>
-            <a:endParaRPr lang="en-US" sz="1100" b="1" dirty="0"/>
           </a:p>
         </p:txBody>
       </p:sp>
@@ -16860,10 +16859,9 @@
           <a:p>
             <a:pPr algn="ctr"/>
             <a:r>
-              <a:rPr lang="en-US" sz="1100" b="1" dirty="0" err="1"/>
+              <a:rPr lang="en-US" sz="1100" b="1" dirty="0"/>
               <a:t>udi</a:t>
             </a:r>
-            <a:endParaRPr lang="en-US" sz="1100" b="1" dirty="0"/>
           </a:p>
         </p:txBody>
       </p:sp>
@@ -19390,6 +19388,21 @@
 </file>
 
 <file path=customXml/item1.xml><?xml version="1.0" encoding="utf-8"?>
+<p:properties xmlns:p="http://schemas.microsoft.com/office/2006/metadata/properties" xmlns:xsi="http://www.w3.org/2001/XMLSchema-instance" xmlns:pc="http://schemas.microsoft.com/office/infopath/2007/PartnerControls">
+  <documentManagement/>
+</p:properties>
+</file>
+
+<file path=customXml/item2.xml><?xml version="1.0" encoding="utf-8"?>
+<?mso-contentType ?>
+<FormTemplates xmlns="http://schemas.microsoft.com/sharepoint/v3/contenttype/forms">
+  <Display>DocumentLibraryForm</Display>
+  <Edit>DocumentLibraryForm</Edit>
+  <New>DocumentLibraryForm</New>
+</FormTemplates>
+</file>
+
+<file path=customXml/item3.xml><?xml version="1.0" encoding="utf-8"?>
 <ct:contentTypeSchema xmlns:ct="http://schemas.microsoft.com/office/2006/metadata/contentType" xmlns:ma="http://schemas.microsoft.com/office/2006/metadata/properties/metaAttributes" ct:_="" ma:_="" ma:contentTypeName="Document" ma:contentTypeID="0x010100E266619F3A8DA84E844CC332E58F8D49" ma:contentTypeVersion="7" ma:contentTypeDescription="Create a new document." ma:contentTypeScope="" ma:versionID="5d8a838ea32704de551bbf800a2359a5">
   <xsd:schema xmlns:xsd="http://www.w3.org/2001/XMLSchema" xmlns:xs="http://www.w3.org/2001/XMLSchema" xmlns:p="http://schemas.microsoft.com/office/2006/metadata/properties" xmlns:ns2="86583c5b-2812-43c9-9d95-43036731b97a" xmlns:ns3="a55e4437-922f-4c3b-a618-0f40b608b01d" targetNamespace="http://schemas.microsoft.com/office/2006/metadata/properties" ma:root="true" ma:fieldsID="403b19a14513e6057a21c0d89da04aa3" ns2:_="" ns3:_="">
     <xsd:import namespace="86583c5b-2812-43c9-9d95-43036731b97a"/>
@@ -19574,22 +19587,32 @@
 </ct:contentTypeSchema>
 </file>
 
-<file path=customXml/item2.xml><?xml version="1.0" encoding="utf-8"?>
-<p:properties xmlns:p="http://schemas.microsoft.com/office/2006/metadata/properties" xmlns:xsi="http://www.w3.org/2001/XMLSchema-instance" xmlns:pc="http://schemas.microsoft.com/office/infopath/2007/PartnerControls">
-  <documentManagement/>
-</p:properties>
+<file path=customXml/itemProps1.xml><?xml version="1.0" encoding="utf-8"?>
+<ds:datastoreItem xmlns:ds="http://schemas.openxmlformats.org/officeDocument/2006/customXml" ds:itemID="{90FDF430-C97A-4E13-9166-89CD4AE896F8}">
+  <ds:schemaRefs>
+    <ds:schemaRef ds:uri="http://schemas.microsoft.com/office/2006/documentManagement/types"/>
+    <ds:schemaRef ds:uri="http://purl.org/dc/elements/1.1/"/>
+    <ds:schemaRef ds:uri="http://schemas.openxmlformats.org/package/2006/metadata/core-properties"/>
+    <ds:schemaRef ds:uri="http://purl.org/dc/terms/"/>
+    <ds:schemaRef ds:uri="http://purl.org/dc/dcmitype/"/>
+    <ds:schemaRef ds:uri="86583c5b-2812-43c9-9d95-43036731b97a"/>
+    <ds:schemaRef ds:uri="a55e4437-922f-4c3b-a618-0f40b608b01d"/>
+    <ds:schemaRef ds:uri="http://schemas.microsoft.com/office/infopath/2007/PartnerControls"/>
+    <ds:schemaRef ds:uri="http://schemas.microsoft.com/office/2006/metadata/properties"/>
+    <ds:schemaRef ds:uri="http://www.w3.org/XML/1998/namespace"/>
+  </ds:schemaRefs>
+</ds:datastoreItem>
 </file>
 
-<file path=customXml/item3.xml><?xml version="1.0" encoding="utf-8"?>
-<?mso-contentType ?>
-<FormTemplates xmlns="http://schemas.microsoft.com/sharepoint/v3/contenttype/forms">
-  <Display>DocumentLibraryForm</Display>
-  <Edit>DocumentLibraryForm</Edit>
-  <New>DocumentLibraryForm</New>
-</FormTemplates>
+<file path=customXml/itemProps2.xml><?xml version="1.0" encoding="utf-8"?>
+<ds:datastoreItem xmlns:ds="http://schemas.openxmlformats.org/officeDocument/2006/customXml" ds:itemID="{7DF32799-2A9E-4894-A7BE-4A93586F7B79}">
+  <ds:schemaRefs>
+    <ds:schemaRef ds:uri="http://schemas.microsoft.com/sharepoint/v3/contenttype/forms"/>
+  </ds:schemaRefs>
+</ds:datastoreItem>
 </file>
 
-<file path=customXml/itemProps1.xml><?xml version="1.0" encoding="utf-8"?>
+<file path=customXml/itemProps3.xml><?xml version="1.0" encoding="utf-8"?>
 <ds:datastoreItem xmlns:ds="http://schemas.openxmlformats.org/officeDocument/2006/customXml" ds:itemID="{57D1FF20-1285-4672-9577-89C47B976660}">
   <ds:schemaRefs>
     <ds:schemaRef ds:uri="http://schemas.microsoft.com/office/2006/metadata/contentType"/>
@@ -19606,29 +19629,4 @@
     <ds:schemaRef ds:uri="http://schemas.microsoft.com/internal/obd"/>
   </ds:schemaRefs>
 </ds:datastoreItem>
-</file>
-
-<file path=customXml/itemProps2.xml><?xml version="1.0" encoding="utf-8"?>
-<ds:datastoreItem xmlns:ds="http://schemas.openxmlformats.org/officeDocument/2006/customXml" ds:itemID="{90FDF430-C97A-4E13-9166-89CD4AE896F8}">
-  <ds:schemaRefs>
-    <ds:schemaRef ds:uri="http://schemas.microsoft.com/office/2006/documentManagement/types"/>
-    <ds:schemaRef ds:uri="http://purl.org/dc/elements/1.1/"/>
-    <ds:schemaRef ds:uri="http://schemas.openxmlformats.org/package/2006/metadata/core-properties"/>
-    <ds:schemaRef ds:uri="http://purl.org/dc/terms/"/>
-    <ds:schemaRef ds:uri="http://purl.org/dc/dcmitype/"/>
-    <ds:schemaRef ds:uri="86583c5b-2812-43c9-9d95-43036731b97a"/>
-    <ds:schemaRef ds:uri="a55e4437-922f-4c3b-a618-0f40b608b01d"/>
-    <ds:schemaRef ds:uri="http://schemas.microsoft.com/office/infopath/2007/PartnerControls"/>
-    <ds:schemaRef ds:uri="http://schemas.microsoft.com/office/2006/metadata/properties"/>
-    <ds:schemaRef ds:uri="http://www.w3.org/XML/1998/namespace"/>
-  </ds:schemaRefs>
-</ds:datastoreItem>
-</file>
-
-<file path=customXml/itemProps3.xml><?xml version="1.0" encoding="utf-8"?>
-<ds:datastoreItem xmlns:ds="http://schemas.openxmlformats.org/officeDocument/2006/customXml" ds:itemID="{7DF32799-2A9E-4894-A7BE-4A93586F7B79}">
-  <ds:schemaRefs>
-    <ds:schemaRef ds:uri="http://schemas.microsoft.com/sharepoint/v3/contenttype/forms"/>
-  </ds:schemaRefs>
-</ds:datastoreItem>
 </file>
</xml_diff>